<commit_message>
Adding button documentation for M5 ATOM
</commit_message>
<xml_diff>
--- a/docs/slides.pptx
+++ b/docs/slides.pptx
@@ -6,6 +6,7 @@
   </p:sldMasterIdLst>
   <p:sldIdLst>
     <p:sldId id="258" r:id="rId2"/>
+    <p:sldId id="259" r:id="rId3"/>
   </p:sldIdLst>
   <p:sldSz cx="12192000" cy="6858000"/>
   <p:notesSz cx="6858000" cy="9144000"/>
@@ -259,7 +260,7 @@
           <a:p>
             <a:fld id="{4F735CCE-55D4-41A9-BDB8-A4CE9CB703D2}" type="datetimeFigureOut">
               <a:rPr lang="en-US" smtClean="0"/>
-              <a:t>12/6/2025</a:t>
+              <a:t>12/7/2025</a:t>
             </a:fld>
             <a:endParaRPr lang="en-US"/>
           </a:p>
@@ -457,7 +458,7 @@
           <a:p>
             <a:fld id="{4F735CCE-55D4-41A9-BDB8-A4CE9CB703D2}" type="datetimeFigureOut">
               <a:rPr lang="en-US" smtClean="0"/>
-              <a:t>12/6/2025</a:t>
+              <a:t>12/7/2025</a:t>
             </a:fld>
             <a:endParaRPr lang="en-US"/>
           </a:p>
@@ -665,7 +666,7 @@
           <a:p>
             <a:fld id="{4F735CCE-55D4-41A9-BDB8-A4CE9CB703D2}" type="datetimeFigureOut">
               <a:rPr lang="en-US" smtClean="0"/>
-              <a:t>12/6/2025</a:t>
+              <a:t>12/7/2025</a:t>
             </a:fld>
             <a:endParaRPr lang="en-US"/>
           </a:p>
@@ -863,7 +864,7 @@
           <a:p>
             <a:fld id="{4F735CCE-55D4-41A9-BDB8-A4CE9CB703D2}" type="datetimeFigureOut">
               <a:rPr lang="en-US" smtClean="0"/>
-              <a:t>12/6/2025</a:t>
+              <a:t>12/7/2025</a:t>
             </a:fld>
             <a:endParaRPr lang="en-US"/>
           </a:p>
@@ -1138,7 +1139,7 @@
           <a:p>
             <a:fld id="{4F735CCE-55D4-41A9-BDB8-A4CE9CB703D2}" type="datetimeFigureOut">
               <a:rPr lang="en-US" smtClean="0"/>
-              <a:t>12/6/2025</a:t>
+              <a:t>12/7/2025</a:t>
             </a:fld>
             <a:endParaRPr lang="en-US"/>
           </a:p>
@@ -1403,7 +1404,7 @@
           <a:p>
             <a:fld id="{4F735CCE-55D4-41A9-BDB8-A4CE9CB703D2}" type="datetimeFigureOut">
               <a:rPr lang="en-US" smtClean="0"/>
-              <a:t>12/6/2025</a:t>
+              <a:t>12/7/2025</a:t>
             </a:fld>
             <a:endParaRPr lang="en-US"/>
           </a:p>
@@ -1815,7 +1816,7 @@
           <a:p>
             <a:fld id="{4F735CCE-55D4-41A9-BDB8-A4CE9CB703D2}" type="datetimeFigureOut">
               <a:rPr lang="en-US" smtClean="0"/>
-              <a:t>12/6/2025</a:t>
+              <a:t>12/7/2025</a:t>
             </a:fld>
             <a:endParaRPr lang="en-US"/>
           </a:p>
@@ -1956,7 +1957,7 @@
           <a:p>
             <a:fld id="{4F735CCE-55D4-41A9-BDB8-A4CE9CB703D2}" type="datetimeFigureOut">
               <a:rPr lang="en-US" smtClean="0"/>
-              <a:t>12/6/2025</a:t>
+              <a:t>12/7/2025</a:t>
             </a:fld>
             <a:endParaRPr lang="en-US"/>
           </a:p>
@@ -2069,7 +2070,7 @@
           <a:p>
             <a:fld id="{4F735CCE-55D4-41A9-BDB8-A4CE9CB703D2}" type="datetimeFigureOut">
               <a:rPr lang="en-US" smtClean="0"/>
-              <a:t>12/6/2025</a:t>
+              <a:t>12/7/2025</a:t>
             </a:fld>
             <a:endParaRPr lang="en-US"/>
           </a:p>
@@ -2380,7 +2381,7 @@
           <a:p>
             <a:fld id="{4F735CCE-55D4-41A9-BDB8-A4CE9CB703D2}" type="datetimeFigureOut">
               <a:rPr lang="en-US" smtClean="0"/>
-              <a:t>12/6/2025</a:t>
+              <a:t>12/7/2025</a:t>
             </a:fld>
             <a:endParaRPr lang="en-US"/>
           </a:p>
@@ -2668,7 +2669,7 @@
           <a:p>
             <a:fld id="{4F735CCE-55D4-41A9-BDB8-A4CE9CB703D2}" type="datetimeFigureOut">
               <a:rPr lang="en-US" smtClean="0"/>
-              <a:t>12/6/2025</a:t>
+              <a:t>12/7/2025</a:t>
             </a:fld>
             <a:endParaRPr lang="en-US"/>
           </a:p>
@@ -2909,7 +2910,7 @@
           <a:p>
             <a:fld id="{4F735CCE-55D4-41A9-BDB8-A4CE9CB703D2}" type="datetimeFigureOut">
               <a:rPr lang="en-US" smtClean="0"/>
-              <a:t>12/6/2025</a:t>
+              <a:t>12/7/2025</a:t>
             </a:fld>
             <a:endParaRPr lang="en-US"/>
           </a:p>
@@ -4012,6 +4013,639 @@
 </p:sld>
 </file>
 
+<file path=ppt/slides/slide2.xml><?xml version="1.0" encoding="utf-8"?>
+<p:sld xmlns:a="http://schemas.openxmlformats.org/drawingml/2006/main" xmlns:r="http://schemas.openxmlformats.org/officeDocument/2006/relationships" xmlns:p="http://schemas.openxmlformats.org/presentationml/2006/main">
+  <p:cSld>
+    <p:spTree>
+      <p:nvGrpSpPr>
+        <p:cNvPr id="1" name=""/>
+        <p:cNvGrpSpPr/>
+        <p:nvPr/>
+      </p:nvGrpSpPr>
+      <p:grpSpPr>
+        <a:xfrm>
+          <a:off x="0" y="0"/>
+          <a:ext cx="0" cy="0"/>
+          <a:chOff x="0" y="0"/>
+          <a:chExt cx="0" cy="0"/>
+        </a:xfrm>
+      </p:grpSpPr>
+      <p:grpSp>
+        <p:nvGrpSpPr>
+          <p:cNvPr id="26" name="Group 25">
+            <a:extLst>
+              <a:ext uri="{FF2B5EF4-FFF2-40B4-BE49-F238E27FC236}">
+                <a16:creationId xmlns:a16="http://schemas.microsoft.com/office/drawing/2014/main" id="{559BAA02-7D48-365D-6217-2E05776B2B85}"/>
+              </a:ext>
+            </a:extLst>
+          </p:cNvPr>
+          <p:cNvGrpSpPr/>
+          <p:nvPr/>
+        </p:nvGrpSpPr>
+        <p:grpSpPr>
+          <a:xfrm>
+            <a:off x="2618695" y="1716518"/>
+            <a:ext cx="6855283" cy="3055056"/>
+            <a:chOff x="2618695" y="1716518"/>
+            <a:chExt cx="6855283" cy="3055056"/>
+          </a:xfrm>
+        </p:grpSpPr>
+        <p:sp>
+          <p:nvSpPr>
+            <p:cNvPr id="25" name="Freeform: Shape 24">
+              <a:extLst>
+                <a:ext uri="{FF2B5EF4-FFF2-40B4-BE49-F238E27FC236}">
+                  <a16:creationId xmlns:a16="http://schemas.microsoft.com/office/drawing/2014/main" id="{96E4EC5B-AE91-B051-F2A4-B8CF2C6C1294}"/>
+                </a:ext>
+              </a:extLst>
+            </p:cNvPr>
+            <p:cNvSpPr/>
+            <p:nvPr/>
+          </p:nvSpPr>
+          <p:spPr>
+            <a:xfrm>
+              <a:off x="4257675" y="1716518"/>
+              <a:ext cx="3590925" cy="1969657"/>
+            </a:xfrm>
+            <a:custGeom>
+              <a:avLst/>
+              <a:gdLst>
+                <a:gd name="connsiteX0" fmla="*/ 0 w 3590925"/>
+                <a:gd name="connsiteY0" fmla="*/ 1969657 h 1969657"/>
+                <a:gd name="connsiteX1" fmla="*/ 1390650 w 3590925"/>
+                <a:gd name="connsiteY1" fmla="*/ 93232 h 1969657"/>
+                <a:gd name="connsiteX2" fmla="*/ 3590925 w 3590925"/>
+                <a:gd name="connsiteY2" fmla="*/ 455182 h 1969657"/>
+              </a:gdLst>
+              <a:ahLst/>
+              <a:cxnLst>
+                <a:cxn ang="0">
+                  <a:pos x="connsiteX0" y="connsiteY0"/>
+                </a:cxn>
+                <a:cxn ang="0">
+                  <a:pos x="connsiteX1" y="connsiteY1"/>
+                </a:cxn>
+                <a:cxn ang="0">
+                  <a:pos x="connsiteX2" y="connsiteY2"/>
+                </a:cxn>
+              </a:cxnLst>
+              <a:rect l="l" t="t" r="r" b="b"/>
+              <a:pathLst>
+                <a:path w="3590925" h="1969657">
+                  <a:moveTo>
+                    <a:pt x="0" y="1969657"/>
+                  </a:moveTo>
+                  <a:cubicBezTo>
+                    <a:pt x="396081" y="1157650"/>
+                    <a:pt x="792163" y="345644"/>
+                    <a:pt x="1390650" y="93232"/>
+                  </a:cubicBezTo>
+                  <a:cubicBezTo>
+                    <a:pt x="1989138" y="-159181"/>
+                    <a:pt x="2790031" y="148000"/>
+                    <a:pt x="3590925" y="455182"/>
+                  </a:cubicBezTo>
+                </a:path>
+              </a:pathLst>
+            </a:custGeom>
+            <a:noFill/>
+            <a:ln w="38100">
+              <a:solidFill>
+                <a:schemeClr val="accent3"/>
+              </a:solidFill>
+              <a:prstDash val="sysDash"/>
+              <a:tailEnd type="triangle"/>
+            </a:ln>
+          </p:spPr>
+          <p:style>
+            <a:lnRef idx="2">
+              <a:schemeClr val="accent1">
+                <a:shade val="15000"/>
+              </a:schemeClr>
+            </a:lnRef>
+            <a:fillRef idx="1">
+              <a:schemeClr val="accent1"/>
+            </a:fillRef>
+            <a:effectRef idx="0">
+              <a:schemeClr val="accent1"/>
+            </a:effectRef>
+            <a:fontRef idx="minor">
+              <a:schemeClr val="lt1"/>
+            </a:fontRef>
+          </p:style>
+          <p:txBody>
+            <a:bodyPr rtlCol="0" anchor="ctr"/>
+            <a:lstStyle/>
+            <a:p>
+              <a:pPr algn="ctr"/>
+              <a:endParaRPr lang="en-US"/>
+            </a:p>
+          </p:txBody>
+        </p:sp>
+        <p:cxnSp>
+          <p:nvCxnSpPr>
+            <p:cNvPr id="21" name="Straight Connector 20">
+              <a:extLst>
+                <a:ext uri="{FF2B5EF4-FFF2-40B4-BE49-F238E27FC236}">
+                  <a16:creationId xmlns:a16="http://schemas.microsoft.com/office/drawing/2014/main" id="{B7F43081-7E3B-8A46-F514-14D8C363D43D}"/>
+                </a:ext>
+              </a:extLst>
+            </p:cNvPr>
+            <p:cNvCxnSpPr>
+              <a:stCxn id="13" idx="3"/>
+            </p:cNvCxnSpPr>
+            <p:nvPr/>
+          </p:nvCxnSpPr>
+          <p:spPr>
+            <a:xfrm flipV="1">
+              <a:off x="7176252" y="3937498"/>
+              <a:ext cx="634247" cy="201309"/>
+            </a:xfrm>
+            <a:prstGeom prst="line">
+              <a:avLst/>
+            </a:prstGeom>
+          </p:spPr>
+          <p:style>
+            <a:lnRef idx="1">
+              <a:schemeClr val="accent1"/>
+            </a:lnRef>
+            <a:fillRef idx="0">
+              <a:schemeClr val="accent1"/>
+            </a:fillRef>
+            <a:effectRef idx="0">
+              <a:schemeClr val="accent1"/>
+            </a:effectRef>
+            <a:fontRef idx="minor">
+              <a:schemeClr val="tx1"/>
+            </a:fontRef>
+          </p:style>
+        </p:cxnSp>
+        <p:pic>
+          <p:nvPicPr>
+            <p:cNvPr id="24" name="Picture 23">
+              <a:extLst>
+                <a:ext uri="{FF2B5EF4-FFF2-40B4-BE49-F238E27FC236}">
+                  <a16:creationId xmlns:a16="http://schemas.microsoft.com/office/drawing/2014/main" id="{C3274FB5-7C7C-0391-89AA-5A62B2DDB8F1}"/>
+                </a:ext>
+              </a:extLst>
+            </p:cNvPr>
+            <p:cNvPicPr>
+              <a:picLocks noChangeAspect="1"/>
+            </p:cNvPicPr>
+            <p:nvPr/>
+          </p:nvPicPr>
+          <p:blipFill>
+            <a:blip r:embed="rId2"/>
+            <a:stretch>
+              <a:fillRect/>
+            </a:stretch>
+          </p:blipFill>
+          <p:spPr>
+            <a:xfrm>
+              <a:off x="7324913" y="1733115"/>
+              <a:ext cx="2149065" cy="3038459"/>
+            </a:xfrm>
+            <a:prstGeom prst="rect">
+              <a:avLst/>
+            </a:prstGeom>
+          </p:spPr>
+        </p:pic>
+        <p:pic>
+          <p:nvPicPr>
+            <p:cNvPr id="2" name="Picture 1">
+              <a:extLst>
+                <a:ext uri="{FF2B5EF4-FFF2-40B4-BE49-F238E27FC236}">
+                  <a16:creationId xmlns:a16="http://schemas.microsoft.com/office/drawing/2014/main" id="{6D3D876E-1C01-C59C-B7C9-B6809A2D6EA9}"/>
+                </a:ext>
+              </a:extLst>
+            </p:cNvPr>
+            <p:cNvPicPr>
+              <a:picLocks noChangeAspect="1"/>
+            </p:cNvPicPr>
+            <p:nvPr/>
+          </p:nvPicPr>
+          <p:blipFill>
+            <a:blip r:embed="rId3"/>
+            <a:stretch>
+              <a:fillRect/>
+            </a:stretch>
+          </p:blipFill>
+          <p:spPr>
+            <a:xfrm>
+              <a:off x="3211097" y="3252346"/>
+              <a:ext cx="1519576" cy="1370305"/>
+            </a:xfrm>
+            <a:prstGeom prst="rect">
+              <a:avLst/>
+            </a:prstGeom>
+            <a:effectLst>
+              <a:outerShdw blurRad="177800" dist="38100" dir="5400000" sx="101000" sy="101000" algn="t" rotWithShape="0">
+                <a:prstClr val="black">
+                  <a:alpha val="40000"/>
+                </a:prstClr>
+              </a:outerShdw>
+            </a:effectLst>
+          </p:spPr>
+        </p:pic>
+        <p:pic>
+          <p:nvPicPr>
+            <p:cNvPr id="4" name="Picture 3">
+              <a:extLst>
+                <a:ext uri="{FF2B5EF4-FFF2-40B4-BE49-F238E27FC236}">
+                  <a16:creationId xmlns:a16="http://schemas.microsoft.com/office/drawing/2014/main" id="{6EF5BC17-EDE7-A608-388E-E999DB47E323}"/>
+                </a:ext>
+              </a:extLst>
+            </p:cNvPr>
+            <p:cNvPicPr>
+              <a:picLocks noChangeAspect="1"/>
+            </p:cNvPicPr>
+            <p:nvPr/>
+          </p:nvPicPr>
+          <p:blipFill>
+            <a:blip r:embed="rId4">
+              <a:extLst>
+                <a:ext uri="{28A0092B-C50C-407E-A947-70E740481C1C}">
+                  <a14:useLocalDpi xmlns:a14="http://schemas.microsoft.com/office/drawing/2010/main" val="0"/>
+                </a:ext>
+              </a:extLst>
+            </a:blip>
+            <a:stretch>
+              <a:fillRect/>
+            </a:stretch>
+          </p:blipFill>
+          <p:spPr>
+            <a:xfrm>
+              <a:off x="5042075" y="2226189"/>
+              <a:ext cx="564636" cy="564636"/>
+            </a:xfrm>
+            <a:prstGeom prst="rect">
+              <a:avLst/>
+            </a:prstGeom>
+          </p:spPr>
+        </p:pic>
+        <p:sp>
+          <p:nvSpPr>
+            <p:cNvPr id="7" name="TextBox 6">
+              <a:extLst>
+                <a:ext uri="{FF2B5EF4-FFF2-40B4-BE49-F238E27FC236}">
+                  <a16:creationId xmlns:a16="http://schemas.microsoft.com/office/drawing/2014/main" id="{8B3123C1-62A9-32F8-9C9F-4442FC918D62}"/>
+                </a:ext>
+              </a:extLst>
+            </p:cNvPr>
+            <p:cNvSpPr txBox="1"/>
+            <p:nvPr/>
+          </p:nvSpPr>
+          <p:spPr>
+            <a:xfrm>
+              <a:off x="2618695" y="2070951"/>
+              <a:ext cx="1980479" cy="646331"/>
+            </a:xfrm>
+            <a:prstGeom prst="rect">
+              <a:avLst/>
+            </a:prstGeom>
+            <a:noFill/>
+          </p:spPr>
+          <p:txBody>
+            <a:bodyPr wrap="none" rtlCol="0">
+              <a:spAutoFit/>
+            </a:bodyPr>
+            <a:lstStyle/>
+            <a:p>
+              <a:pPr algn="ctr"/>
+              <a:r>
+                <a:rPr lang="en-US" dirty="0"/>
+                <a:t>Press the button to</a:t>
+              </a:r>
+              <a:br>
+                <a:rPr lang="en-US" dirty="0"/>
+              </a:br>
+              <a:r>
+                <a:rPr lang="en-US" dirty="0"/>
+                <a:t>toggle a function.</a:t>
+              </a:r>
+            </a:p>
+          </p:txBody>
+        </p:sp>
+        <p:cxnSp>
+          <p:nvCxnSpPr>
+            <p:cNvPr id="9" name="Straight Arrow Connector 8">
+              <a:extLst>
+                <a:ext uri="{FF2B5EF4-FFF2-40B4-BE49-F238E27FC236}">
+                  <a16:creationId xmlns:a16="http://schemas.microsoft.com/office/drawing/2014/main" id="{13E245F8-E40D-D934-83E3-ECF0ABAD45D7}"/>
+                </a:ext>
+              </a:extLst>
+            </p:cNvPr>
+            <p:cNvCxnSpPr>
+              <a:cxnSpLocks/>
+            </p:cNvCxnSpPr>
+            <p:nvPr/>
+          </p:nvCxnSpPr>
+          <p:spPr>
+            <a:xfrm flipH="1">
+              <a:off x="3961359" y="2717282"/>
+              <a:ext cx="1" cy="880811"/>
+            </a:xfrm>
+            <a:prstGeom prst="straightConnector1">
+              <a:avLst/>
+            </a:prstGeom>
+            <a:ln w="60325">
+              <a:solidFill>
+                <a:schemeClr val="accent2"/>
+              </a:solidFill>
+              <a:tailEnd type="triangle"/>
+            </a:ln>
+          </p:spPr>
+          <p:style>
+            <a:lnRef idx="1">
+              <a:schemeClr val="accent1"/>
+            </a:lnRef>
+            <a:fillRef idx="0">
+              <a:schemeClr val="accent1"/>
+            </a:fillRef>
+            <a:effectRef idx="0">
+              <a:schemeClr val="accent1"/>
+            </a:effectRef>
+            <a:fontRef idx="minor">
+              <a:schemeClr val="tx1"/>
+            </a:fontRef>
+          </p:style>
+        </p:cxnSp>
+        <p:sp>
+          <p:nvSpPr>
+            <p:cNvPr id="10" name="TextBox 9">
+              <a:extLst>
+                <a:ext uri="{FF2B5EF4-FFF2-40B4-BE49-F238E27FC236}">
+                  <a16:creationId xmlns:a16="http://schemas.microsoft.com/office/drawing/2014/main" id="{384E1B36-3217-9C73-9BF7-111467FE6389}"/>
+                </a:ext>
+              </a:extLst>
+            </p:cNvPr>
+            <p:cNvSpPr txBox="1"/>
+            <p:nvPr/>
+          </p:nvSpPr>
+          <p:spPr>
+            <a:xfrm>
+              <a:off x="5918340" y="2096278"/>
+              <a:ext cx="1217834" cy="369332"/>
+            </a:xfrm>
+            <a:prstGeom prst="rect">
+              <a:avLst/>
+            </a:prstGeom>
+            <a:noFill/>
+          </p:spPr>
+          <p:txBody>
+            <a:bodyPr wrap="none" rtlCol="0">
+              <a:spAutoFit/>
+            </a:bodyPr>
+            <a:lstStyle/>
+            <a:p>
+              <a:r>
+                <a:rPr lang="en-US" dirty="0"/>
+                <a:t>Toggle USB</a:t>
+              </a:r>
+            </a:p>
+          </p:txBody>
+        </p:sp>
+        <p:sp>
+          <p:nvSpPr>
+            <p:cNvPr id="11" name="TextBox 10">
+              <a:extLst>
+                <a:ext uri="{FF2B5EF4-FFF2-40B4-BE49-F238E27FC236}">
+                  <a16:creationId xmlns:a16="http://schemas.microsoft.com/office/drawing/2014/main" id="{EBD335C8-B999-D8EC-0B56-452AA2D57B32}"/>
+                </a:ext>
+              </a:extLst>
+            </p:cNvPr>
+            <p:cNvSpPr txBox="1"/>
+            <p:nvPr/>
+          </p:nvSpPr>
+          <p:spPr>
+            <a:xfrm>
+              <a:off x="5720911" y="2717282"/>
+              <a:ext cx="1105624" cy="369332"/>
+            </a:xfrm>
+            <a:prstGeom prst="rect">
+              <a:avLst/>
+            </a:prstGeom>
+            <a:noFill/>
+          </p:spPr>
+          <p:txBody>
+            <a:bodyPr wrap="none" rtlCol="0">
+              <a:spAutoFit/>
+            </a:bodyPr>
+            <a:lstStyle/>
+            <a:p>
+              <a:r>
+                <a:rPr lang="en-US" dirty="0"/>
+                <a:t>Toggle DC</a:t>
+              </a:r>
+            </a:p>
+          </p:txBody>
+        </p:sp>
+        <p:sp>
+          <p:nvSpPr>
+            <p:cNvPr id="12" name="TextBox 11">
+              <a:extLst>
+                <a:ext uri="{FF2B5EF4-FFF2-40B4-BE49-F238E27FC236}">
+                  <a16:creationId xmlns:a16="http://schemas.microsoft.com/office/drawing/2014/main" id="{B99DC5A4-2D92-0D53-7911-45EAF2CD540E}"/>
+                </a:ext>
+              </a:extLst>
+            </p:cNvPr>
+            <p:cNvSpPr txBox="1"/>
+            <p:nvPr/>
+          </p:nvSpPr>
+          <p:spPr>
+            <a:xfrm>
+              <a:off x="5729513" y="3252345"/>
+              <a:ext cx="1094339" cy="369332"/>
+            </a:xfrm>
+            <a:prstGeom prst="rect">
+              <a:avLst/>
+            </a:prstGeom>
+            <a:noFill/>
+          </p:spPr>
+          <p:txBody>
+            <a:bodyPr wrap="none" rtlCol="0">
+              <a:spAutoFit/>
+            </a:bodyPr>
+            <a:lstStyle/>
+            <a:p>
+              <a:r>
+                <a:rPr lang="en-US" dirty="0"/>
+                <a:t>Toggle AC</a:t>
+              </a:r>
+            </a:p>
+          </p:txBody>
+        </p:sp>
+        <p:sp>
+          <p:nvSpPr>
+            <p:cNvPr id="13" name="TextBox 12">
+              <a:extLst>
+                <a:ext uri="{FF2B5EF4-FFF2-40B4-BE49-F238E27FC236}">
+                  <a16:creationId xmlns:a16="http://schemas.microsoft.com/office/drawing/2014/main" id="{B8D6A243-DCC0-9DA0-DF9D-8DC38AEE0C5F}"/>
+                </a:ext>
+              </a:extLst>
+            </p:cNvPr>
+            <p:cNvSpPr txBox="1"/>
+            <p:nvPr/>
+          </p:nvSpPr>
+          <p:spPr>
+            <a:xfrm>
+              <a:off x="5880384" y="3873349"/>
+              <a:ext cx="1295868" cy="530915"/>
+            </a:xfrm>
+            <a:prstGeom prst="rect">
+              <a:avLst/>
+            </a:prstGeom>
+            <a:noFill/>
+          </p:spPr>
+          <p:txBody>
+            <a:bodyPr wrap="none" rtlCol="0">
+              <a:spAutoFit/>
+            </a:bodyPr>
+            <a:lstStyle/>
+            <a:p>
+              <a:pPr algn="ctr"/>
+              <a:r>
+                <a:rPr lang="en-US" dirty="0"/>
+                <a:t>Toggle Light</a:t>
+              </a:r>
+              <a:br>
+                <a:rPr lang="en-US" dirty="0"/>
+              </a:br>
+              <a:r>
+                <a:rPr lang="en-US" sz="1050" dirty="0"/>
+                <a:t>(In back)</a:t>
+              </a:r>
+            </a:p>
+          </p:txBody>
+        </p:sp>
+        <p:cxnSp>
+          <p:nvCxnSpPr>
+            <p:cNvPr id="15" name="Straight Connector 14">
+              <a:extLst>
+                <a:ext uri="{FF2B5EF4-FFF2-40B4-BE49-F238E27FC236}">
+                  <a16:creationId xmlns:a16="http://schemas.microsoft.com/office/drawing/2014/main" id="{F802D709-327A-8072-E5C8-87CE0CA3F94A}"/>
+                </a:ext>
+              </a:extLst>
+            </p:cNvPr>
+            <p:cNvCxnSpPr>
+              <a:stCxn id="10" idx="3"/>
+            </p:cNvCxnSpPr>
+            <p:nvPr/>
+          </p:nvCxnSpPr>
+          <p:spPr>
+            <a:xfrm>
+              <a:off x="7136174" y="2280944"/>
+              <a:ext cx="1036275" cy="509881"/>
+            </a:xfrm>
+            <a:prstGeom prst="line">
+              <a:avLst/>
+            </a:prstGeom>
+          </p:spPr>
+          <p:style>
+            <a:lnRef idx="1">
+              <a:schemeClr val="accent1"/>
+            </a:lnRef>
+            <a:fillRef idx="0">
+              <a:schemeClr val="accent1"/>
+            </a:fillRef>
+            <a:effectRef idx="0">
+              <a:schemeClr val="accent1"/>
+            </a:effectRef>
+            <a:fontRef idx="minor">
+              <a:schemeClr val="tx1"/>
+            </a:fontRef>
+          </p:style>
+        </p:cxnSp>
+        <p:cxnSp>
+          <p:nvCxnSpPr>
+            <p:cNvPr id="17" name="Straight Connector 16">
+              <a:extLst>
+                <a:ext uri="{FF2B5EF4-FFF2-40B4-BE49-F238E27FC236}">
+                  <a16:creationId xmlns:a16="http://schemas.microsoft.com/office/drawing/2014/main" id="{B8D7FA85-A56F-A648-86CA-D87F0F82A1E6}"/>
+                </a:ext>
+              </a:extLst>
+            </p:cNvPr>
+            <p:cNvCxnSpPr>
+              <a:stCxn id="11" idx="3"/>
+            </p:cNvCxnSpPr>
+            <p:nvPr/>
+          </p:nvCxnSpPr>
+          <p:spPr>
+            <a:xfrm>
+              <a:off x="6826535" y="2901948"/>
+              <a:ext cx="1155414" cy="350397"/>
+            </a:xfrm>
+            <a:prstGeom prst="line">
+              <a:avLst/>
+            </a:prstGeom>
+          </p:spPr>
+          <p:style>
+            <a:lnRef idx="1">
+              <a:schemeClr val="accent1"/>
+            </a:lnRef>
+            <a:fillRef idx="0">
+              <a:schemeClr val="accent1"/>
+            </a:fillRef>
+            <a:effectRef idx="0">
+              <a:schemeClr val="accent1"/>
+            </a:effectRef>
+            <a:fontRef idx="minor">
+              <a:schemeClr val="tx1"/>
+            </a:fontRef>
+          </p:style>
+        </p:cxnSp>
+        <p:cxnSp>
+          <p:nvCxnSpPr>
+            <p:cNvPr id="19" name="Straight Connector 18">
+              <a:extLst>
+                <a:ext uri="{FF2B5EF4-FFF2-40B4-BE49-F238E27FC236}">
+                  <a16:creationId xmlns:a16="http://schemas.microsoft.com/office/drawing/2014/main" id="{BCCB8B48-352B-B4ED-778B-9DF6ABB34562}"/>
+                </a:ext>
+              </a:extLst>
+            </p:cNvPr>
+            <p:cNvCxnSpPr>
+              <a:stCxn id="12" idx="3"/>
+            </p:cNvCxnSpPr>
+            <p:nvPr/>
+          </p:nvCxnSpPr>
+          <p:spPr>
+            <a:xfrm>
+              <a:off x="6823852" y="3437011"/>
+              <a:ext cx="1158097" cy="363464"/>
+            </a:xfrm>
+            <a:prstGeom prst="line">
+              <a:avLst/>
+            </a:prstGeom>
+          </p:spPr>
+          <p:style>
+            <a:lnRef idx="1">
+              <a:schemeClr val="accent1"/>
+            </a:lnRef>
+            <a:fillRef idx="0">
+              <a:schemeClr val="accent1"/>
+            </a:fillRef>
+            <a:effectRef idx="0">
+              <a:schemeClr val="accent1"/>
+            </a:effectRef>
+            <a:fontRef idx="minor">
+              <a:schemeClr val="tx1"/>
+            </a:fontRef>
+          </p:style>
+        </p:cxnSp>
+      </p:grpSp>
+    </p:spTree>
+    <p:extLst>
+      <p:ext uri="{BB962C8B-B14F-4D97-AF65-F5344CB8AC3E}">
+        <p14:creationId xmlns:p14="http://schemas.microsoft.com/office/powerpoint/2010/main" val="4150284984"/>
+      </p:ext>
+    </p:extLst>
+  </p:cSld>
+  <p:clrMapOvr>
+    <a:masterClrMapping/>
+  </p:clrMapOvr>
+</p:sld>
+</file>
+
 <file path=ppt/theme/theme1.xml><?xml version="1.0" encoding="utf-8"?>
 <a:theme xmlns:a="http://schemas.openxmlformats.org/drawingml/2006/main" name="Office Theme">
   <a:themeElements>
@@ -4297,7 +4931,42 @@
       </a:bgFillStyleLst>
     </a:fmtScheme>
   </a:themeElements>
-  <a:objectDefaults/>
+  <a:objectDefaults>
+    <a:spDef>
+      <a:spPr>
+        <a:noFill/>
+        <a:ln w="38100">
+          <a:solidFill>
+            <a:schemeClr val="accent3"/>
+          </a:solidFill>
+          <a:prstDash val="sysDash"/>
+          <a:tailEnd type="triangle"/>
+        </a:ln>
+      </a:spPr>
+      <a:bodyPr rtlCol="0" anchor="ctr"/>
+      <a:lstStyle>
+        <a:defPPr algn="ctr">
+          <a:defRPr/>
+        </a:defPPr>
+      </a:lstStyle>
+      <a:style>
+        <a:lnRef idx="2">
+          <a:schemeClr val="accent1">
+            <a:shade val="15000"/>
+          </a:schemeClr>
+        </a:lnRef>
+        <a:fillRef idx="1">
+          <a:schemeClr val="accent1"/>
+        </a:fillRef>
+        <a:effectRef idx="0">
+          <a:schemeClr val="accent1"/>
+        </a:effectRef>
+        <a:fontRef idx="minor">
+          <a:schemeClr val="lt1"/>
+        </a:fontRef>
+      </a:style>
+    </a:spDef>
+  </a:objectDefaults>
   <a:extraClrSchemeLst/>
   <a:extLst>
     <a:ext uri="{05A4C25C-085E-4340-85A3-A5531E510DB2}">

</xml_diff>